<commit_message>
Data Preprocessing: Create the sliding windows for 5 options
</commit_message>
<xml_diff>
--- a/Daily/sprint6/Sprint6_Review.pptx
+++ b/Daily/sprint6/Sprint6_Review.pptx
@@ -1239,7 +1239,7 @@
           <p:cNvPr id="2" name="Titel 1">
             <a:extLst>
               <a:ext uri="{FF2B5EF4-FFF2-40B4-BE49-F238E27FC236}">
-                <a16:creationId xmlns:a16="http://schemas.microsoft.com/office/drawing/2014/main" xmlns="" id="{701EABE2-81DB-4A57-87BD-BAC9B81DA953}"/>
+                <a16:creationId xmlns="" xmlns:a16="http://schemas.microsoft.com/office/drawing/2014/main" id="{701EABE2-81DB-4A57-87BD-BAC9B81DA953}"/>
               </a:ext>
             </a:extLst>
           </p:cNvPr>
@@ -1276,7 +1276,7 @@
           <p:cNvPr id="3" name="Untertitel 2">
             <a:extLst>
               <a:ext uri="{FF2B5EF4-FFF2-40B4-BE49-F238E27FC236}">
-                <a16:creationId xmlns:a16="http://schemas.microsoft.com/office/drawing/2014/main" xmlns="" id="{9E44B19B-9953-4462-B98C-34C559DFD4BA}"/>
+                <a16:creationId xmlns="" xmlns:a16="http://schemas.microsoft.com/office/drawing/2014/main" id="{9E44B19B-9953-4462-B98C-34C559DFD4BA}"/>
               </a:ext>
             </a:extLst>
           </p:cNvPr>
@@ -1346,7 +1346,7 @@
           <p:cNvPr id="4" name="Datumsplatzhalter 3">
             <a:extLst>
               <a:ext uri="{FF2B5EF4-FFF2-40B4-BE49-F238E27FC236}">
-                <a16:creationId xmlns:a16="http://schemas.microsoft.com/office/drawing/2014/main" xmlns="" id="{85282A0B-87AA-4F5C-9252-AB7E74ABF29B}"/>
+                <a16:creationId xmlns="" xmlns:a16="http://schemas.microsoft.com/office/drawing/2014/main" id="{85282A0B-87AA-4F5C-9252-AB7E74ABF29B}"/>
               </a:ext>
             </a:extLst>
           </p:cNvPr>
@@ -1375,7 +1375,7 @@
           <p:cNvPr id="5" name="Fußzeilenplatzhalter 4">
             <a:extLst>
               <a:ext uri="{FF2B5EF4-FFF2-40B4-BE49-F238E27FC236}">
-                <a16:creationId xmlns:a16="http://schemas.microsoft.com/office/drawing/2014/main" xmlns="" id="{CCE46F71-BCF6-41F3-8C17-381DF36140FE}"/>
+                <a16:creationId xmlns="" xmlns:a16="http://schemas.microsoft.com/office/drawing/2014/main" id="{CCE46F71-BCF6-41F3-8C17-381DF36140FE}"/>
               </a:ext>
             </a:extLst>
           </p:cNvPr>
@@ -1408,7 +1408,7 @@
           <p:cNvPr id="6" name="Foliennummernplatzhalter 5">
             <a:extLst>
               <a:ext uri="{FF2B5EF4-FFF2-40B4-BE49-F238E27FC236}">
-                <a16:creationId xmlns:a16="http://schemas.microsoft.com/office/drawing/2014/main" xmlns="" id="{DF41A37E-A33B-4798-9922-3B8B5AE5A27B}"/>
+                <a16:creationId xmlns="" xmlns:a16="http://schemas.microsoft.com/office/drawing/2014/main" id="{DF41A37E-A33B-4798-9922-3B8B5AE5A27B}"/>
               </a:ext>
             </a:extLst>
           </p:cNvPr>
@@ -1475,7 +1475,7 @@
           <p:cNvPr id="2" name="Titel 1">
             <a:extLst>
               <a:ext uri="{FF2B5EF4-FFF2-40B4-BE49-F238E27FC236}">
-                <a16:creationId xmlns:a16="http://schemas.microsoft.com/office/drawing/2014/main" xmlns="" id="{FCE4A30D-3A8C-4B77-B82E-724CCF54EFD5}"/>
+                <a16:creationId xmlns="" xmlns:a16="http://schemas.microsoft.com/office/drawing/2014/main" id="{FCE4A30D-3A8C-4B77-B82E-724CCF54EFD5}"/>
               </a:ext>
             </a:extLst>
           </p:cNvPr>
@@ -1503,7 +1503,7 @@
           <p:cNvPr id="3" name="Vertikaler Textplatzhalter 2">
             <a:extLst>
               <a:ext uri="{FF2B5EF4-FFF2-40B4-BE49-F238E27FC236}">
-                <a16:creationId xmlns:a16="http://schemas.microsoft.com/office/drawing/2014/main" xmlns="" id="{D0312C4C-DD67-420D-AE80-FBF20CAD00FE}"/>
+                <a16:creationId xmlns="" xmlns:a16="http://schemas.microsoft.com/office/drawing/2014/main" id="{D0312C4C-DD67-420D-AE80-FBF20CAD00FE}"/>
               </a:ext>
             </a:extLst>
           </p:cNvPr>
@@ -1560,7 +1560,7 @@
           <p:cNvPr id="4" name="Datumsplatzhalter 3">
             <a:extLst>
               <a:ext uri="{FF2B5EF4-FFF2-40B4-BE49-F238E27FC236}">
-                <a16:creationId xmlns:a16="http://schemas.microsoft.com/office/drawing/2014/main" xmlns="" id="{752D94C2-424D-4096-8FAE-F12A3D4A5C7D}"/>
+                <a16:creationId xmlns="" xmlns:a16="http://schemas.microsoft.com/office/drawing/2014/main" id="{752D94C2-424D-4096-8FAE-F12A3D4A5C7D}"/>
               </a:ext>
             </a:extLst>
           </p:cNvPr>
@@ -1589,7 +1589,7 @@
           <p:cNvPr id="5" name="Fußzeilenplatzhalter 4">
             <a:extLst>
               <a:ext uri="{FF2B5EF4-FFF2-40B4-BE49-F238E27FC236}">
-                <a16:creationId xmlns:a16="http://schemas.microsoft.com/office/drawing/2014/main" xmlns="" id="{02BB29D6-C358-4D1F-90A7-5282C5CF3A2B}"/>
+                <a16:creationId xmlns="" xmlns:a16="http://schemas.microsoft.com/office/drawing/2014/main" id="{02BB29D6-C358-4D1F-90A7-5282C5CF3A2B}"/>
               </a:ext>
             </a:extLst>
           </p:cNvPr>
@@ -1617,7 +1617,7 @@
           <p:cNvPr id="6" name="Foliennummernplatzhalter 5">
             <a:extLst>
               <a:ext uri="{FF2B5EF4-FFF2-40B4-BE49-F238E27FC236}">
-                <a16:creationId xmlns:a16="http://schemas.microsoft.com/office/drawing/2014/main" xmlns="" id="{AE9CFC43-FC34-49A0-9C58-C1BA7EAB4CD1}"/>
+                <a16:creationId xmlns="" xmlns:a16="http://schemas.microsoft.com/office/drawing/2014/main" id="{AE9CFC43-FC34-49A0-9C58-C1BA7EAB4CD1}"/>
               </a:ext>
             </a:extLst>
           </p:cNvPr>
@@ -1684,7 +1684,7 @@
           <p:cNvPr id="2" name="Vertikaler Titel 1">
             <a:extLst>
               <a:ext uri="{FF2B5EF4-FFF2-40B4-BE49-F238E27FC236}">
-                <a16:creationId xmlns:a16="http://schemas.microsoft.com/office/drawing/2014/main" xmlns="" id="{C6AE7126-CFA4-458D-B5F5-AA476ABB117D}"/>
+                <a16:creationId xmlns="" xmlns:a16="http://schemas.microsoft.com/office/drawing/2014/main" id="{C6AE7126-CFA4-458D-B5F5-AA476ABB117D}"/>
               </a:ext>
             </a:extLst>
           </p:cNvPr>
@@ -1717,7 +1717,7 @@
           <p:cNvPr id="3" name="Vertikaler Textplatzhalter 2">
             <a:extLst>
               <a:ext uri="{FF2B5EF4-FFF2-40B4-BE49-F238E27FC236}">
-                <a16:creationId xmlns:a16="http://schemas.microsoft.com/office/drawing/2014/main" xmlns="" id="{E4719945-B69E-4CB7-AF62-A8E248C097C4}"/>
+                <a16:creationId xmlns="" xmlns:a16="http://schemas.microsoft.com/office/drawing/2014/main" id="{E4719945-B69E-4CB7-AF62-A8E248C097C4}"/>
               </a:ext>
             </a:extLst>
           </p:cNvPr>
@@ -1779,7 +1779,7 @@
           <p:cNvPr id="4" name="Datumsplatzhalter 3">
             <a:extLst>
               <a:ext uri="{FF2B5EF4-FFF2-40B4-BE49-F238E27FC236}">
-                <a16:creationId xmlns:a16="http://schemas.microsoft.com/office/drawing/2014/main" xmlns="" id="{194C9456-1825-45D5-AFC8-7437C4E58D48}"/>
+                <a16:creationId xmlns="" xmlns:a16="http://schemas.microsoft.com/office/drawing/2014/main" id="{194C9456-1825-45D5-AFC8-7437C4E58D48}"/>
               </a:ext>
             </a:extLst>
           </p:cNvPr>
@@ -1808,7 +1808,7 @@
           <p:cNvPr id="5" name="Fußzeilenplatzhalter 4">
             <a:extLst>
               <a:ext uri="{FF2B5EF4-FFF2-40B4-BE49-F238E27FC236}">
-                <a16:creationId xmlns:a16="http://schemas.microsoft.com/office/drawing/2014/main" xmlns="" id="{0B1CC9B3-FE3E-4DC0-B71D-312C93D1814D}"/>
+                <a16:creationId xmlns="" xmlns:a16="http://schemas.microsoft.com/office/drawing/2014/main" id="{0B1CC9B3-FE3E-4DC0-B71D-312C93D1814D}"/>
               </a:ext>
             </a:extLst>
           </p:cNvPr>
@@ -1836,7 +1836,7 @@
           <p:cNvPr id="6" name="Foliennummernplatzhalter 5">
             <a:extLst>
               <a:ext uri="{FF2B5EF4-FFF2-40B4-BE49-F238E27FC236}">
-                <a16:creationId xmlns:a16="http://schemas.microsoft.com/office/drawing/2014/main" xmlns="" id="{41E050D8-C164-4E85-94F4-BA2B19D46D58}"/>
+                <a16:creationId xmlns="" xmlns:a16="http://schemas.microsoft.com/office/drawing/2014/main" id="{41E050D8-C164-4E85-94F4-BA2B19D46D58}"/>
               </a:ext>
             </a:extLst>
           </p:cNvPr>
@@ -1903,7 +1903,7 @@
           <p:cNvPr id="2" name="Titel 1">
             <a:extLst>
               <a:ext uri="{FF2B5EF4-FFF2-40B4-BE49-F238E27FC236}">
-                <a16:creationId xmlns:a16="http://schemas.microsoft.com/office/drawing/2014/main" xmlns="" id="{C9100C2D-6625-4AF5-8937-424086BE0285}"/>
+                <a16:creationId xmlns="" xmlns:a16="http://schemas.microsoft.com/office/drawing/2014/main" id="{C9100C2D-6625-4AF5-8937-424086BE0285}"/>
               </a:ext>
             </a:extLst>
           </p:cNvPr>
@@ -1931,7 +1931,7 @@
           <p:cNvPr id="3" name="Inhaltsplatzhalter 2">
             <a:extLst>
               <a:ext uri="{FF2B5EF4-FFF2-40B4-BE49-F238E27FC236}">
-                <a16:creationId xmlns:a16="http://schemas.microsoft.com/office/drawing/2014/main" xmlns="" id="{38D1AAA1-BE3D-4A43-91C4-A2C3C6173375}"/>
+                <a16:creationId xmlns="" xmlns:a16="http://schemas.microsoft.com/office/drawing/2014/main" id="{38D1AAA1-BE3D-4A43-91C4-A2C3C6173375}"/>
               </a:ext>
             </a:extLst>
           </p:cNvPr>
@@ -1988,7 +1988,7 @@
           <p:cNvPr id="4" name="Datumsplatzhalter 3">
             <a:extLst>
               <a:ext uri="{FF2B5EF4-FFF2-40B4-BE49-F238E27FC236}">
-                <a16:creationId xmlns:a16="http://schemas.microsoft.com/office/drawing/2014/main" xmlns="" id="{48884C8B-06F5-44CC-B1D1-2A02463EC226}"/>
+                <a16:creationId xmlns="" xmlns:a16="http://schemas.microsoft.com/office/drawing/2014/main" id="{48884C8B-06F5-44CC-B1D1-2A02463EC226}"/>
               </a:ext>
             </a:extLst>
           </p:cNvPr>
@@ -2017,7 +2017,7 @@
           <p:cNvPr id="5" name="Fußzeilenplatzhalter 4">
             <a:extLst>
               <a:ext uri="{FF2B5EF4-FFF2-40B4-BE49-F238E27FC236}">
-                <a16:creationId xmlns:a16="http://schemas.microsoft.com/office/drawing/2014/main" xmlns="" id="{2EE480CA-0EC1-4AF7-9F30-F143FE83D99B}"/>
+                <a16:creationId xmlns="" xmlns:a16="http://schemas.microsoft.com/office/drawing/2014/main" id="{2EE480CA-0EC1-4AF7-9F30-F143FE83D99B}"/>
               </a:ext>
             </a:extLst>
           </p:cNvPr>
@@ -2050,7 +2050,7 @@
           <p:cNvPr id="6" name="Foliennummernplatzhalter 5">
             <a:extLst>
               <a:ext uri="{FF2B5EF4-FFF2-40B4-BE49-F238E27FC236}">
-                <a16:creationId xmlns:a16="http://schemas.microsoft.com/office/drawing/2014/main" xmlns="" id="{13337EC3-94DD-4B09-A484-F0141C1CB8B0}"/>
+                <a16:creationId xmlns="" xmlns:a16="http://schemas.microsoft.com/office/drawing/2014/main" id="{13337EC3-94DD-4B09-A484-F0141C1CB8B0}"/>
               </a:ext>
             </a:extLst>
           </p:cNvPr>
@@ -2117,7 +2117,7 @@
           <p:cNvPr id="2" name="Titel 1">
             <a:extLst>
               <a:ext uri="{FF2B5EF4-FFF2-40B4-BE49-F238E27FC236}">
-                <a16:creationId xmlns:a16="http://schemas.microsoft.com/office/drawing/2014/main" xmlns="" id="{CBDD584A-A976-4556-9716-DA9197EACC6F}"/>
+                <a16:creationId xmlns="" xmlns:a16="http://schemas.microsoft.com/office/drawing/2014/main" id="{CBDD584A-A976-4556-9716-DA9197EACC6F}"/>
               </a:ext>
             </a:extLst>
           </p:cNvPr>
@@ -2154,7 +2154,7 @@
           <p:cNvPr id="3" name="Textplatzhalter 2">
             <a:extLst>
               <a:ext uri="{FF2B5EF4-FFF2-40B4-BE49-F238E27FC236}">
-                <a16:creationId xmlns:a16="http://schemas.microsoft.com/office/drawing/2014/main" xmlns="" id="{C713F004-8C3B-4899-9F30-C6CC20E50B36}"/>
+                <a16:creationId xmlns="" xmlns:a16="http://schemas.microsoft.com/office/drawing/2014/main" id="{C713F004-8C3B-4899-9F30-C6CC20E50B36}"/>
               </a:ext>
             </a:extLst>
           </p:cNvPr>
@@ -2279,7 +2279,7 @@
           <p:cNvPr id="4" name="Datumsplatzhalter 3">
             <a:extLst>
               <a:ext uri="{FF2B5EF4-FFF2-40B4-BE49-F238E27FC236}">
-                <a16:creationId xmlns:a16="http://schemas.microsoft.com/office/drawing/2014/main" xmlns="" id="{B300BECA-2226-430E-B31A-3A70D7FB0DD4}"/>
+                <a16:creationId xmlns="" xmlns:a16="http://schemas.microsoft.com/office/drawing/2014/main" id="{B300BECA-2226-430E-B31A-3A70D7FB0DD4}"/>
               </a:ext>
             </a:extLst>
           </p:cNvPr>
@@ -2308,7 +2308,7 @@
           <p:cNvPr id="5" name="Fußzeilenplatzhalter 4">
             <a:extLst>
               <a:ext uri="{FF2B5EF4-FFF2-40B4-BE49-F238E27FC236}">
-                <a16:creationId xmlns:a16="http://schemas.microsoft.com/office/drawing/2014/main" xmlns="" id="{9D2C0B24-C4C7-4E3E-A30D-AD2B22A8CAC5}"/>
+                <a16:creationId xmlns="" xmlns:a16="http://schemas.microsoft.com/office/drawing/2014/main" id="{9D2C0B24-C4C7-4E3E-A30D-AD2B22A8CAC5}"/>
               </a:ext>
             </a:extLst>
           </p:cNvPr>
@@ -2341,7 +2341,7 @@
           <p:cNvPr id="6" name="Foliennummernplatzhalter 5">
             <a:extLst>
               <a:ext uri="{FF2B5EF4-FFF2-40B4-BE49-F238E27FC236}">
-                <a16:creationId xmlns:a16="http://schemas.microsoft.com/office/drawing/2014/main" xmlns="" id="{15EF3485-89F1-47E8-AB99-914FE8775138}"/>
+                <a16:creationId xmlns="" xmlns:a16="http://schemas.microsoft.com/office/drawing/2014/main" id="{15EF3485-89F1-47E8-AB99-914FE8775138}"/>
               </a:ext>
             </a:extLst>
           </p:cNvPr>
@@ -2408,7 +2408,7 @@
           <p:cNvPr id="2" name="Titel 1">
             <a:extLst>
               <a:ext uri="{FF2B5EF4-FFF2-40B4-BE49-F238E27FC236}">
-                <a16:creationId xmlns:a16="http://schemas.microsoft.com/office/drawing/2014/main" xmlns="" id="{6B45D284-4E4F-4976-80EC-400821F99BCF}"/>
+                <a16:creationId xmlns="" xmlns:a16="http://schemas.microsoft.com/office/drawing/2014/main" id="{6B45D284-4E4F-4976-80EC-400821F99BCF}"/>
               </a:ext>
             </a:extLst>
           </p:cNvPr>
@@ -2436,7 +2436,7 @@
           <p:cNvPr id="3" name="Inhaltsplatzhalter 2">
             <a:extLst>
               <a:ext uri="{FF2B5EF4-FFF2-40B4-BE49-F238E27FC236}">
-                <a16:creationId xmlns:a16="http://schemas.microsoft.com/office/drawing/2014/main" xmlns="" id="{61C980E4-B51F-4860-A848-EB6955BA36AF}"/>
+                <a16:creationId xmlns="" xmlns:a16="http://schemas.microsoft.com/office/drawing/2014/main" id="{61C980E4-B51F-4860-A848-EB6955BA36AF}"/>
               </a:ext>
             </a:extLst>
           </p:cNvPr>
@@ -2498,7 +2498,7 @@
           <p:cNvPr id="4" name="Inhaltsplatzhalter 3">
             <a:extLst>
               <a:ext uri="{FF2B5EF4-FFF2-40B4-BE49-F238E27FC236}">
-                <a16:creationId xmlns:a16="http://schemas.microsoft.com/office/drawing/2014/main" xmlns="" id="{8D7C296F-6044-4CF6-BBE5-CEA4560EEEB9}"/>
+                <a16:creationId xmlns="" xmlns:a16="http://schemas.microsoft.com/office/drawing/2014/main" id="{8D7C296F-6044-4CF6-BBE5-CEA4560EEEB9}"/>
               </a:ext>
             </a:extLst>
           </p:cNvPr>
@@ -2560,7 +2560,7 @@
           <p:cNvPr id="5" name="Datumsplatzhalter 4">
             <a:extLst>
               <a:ext uri="{FF2B5EF4-FFF2-40B4-BE49-F238E27FC236}">
-                <a16:creationId xmlns:a16="http://schemas.microsoft.com/office/drawing/2014/main" xmlns="" id="{F87A09FB-245D-407E-94D1-C81BBB221DC2}"/>
+                <a16:creationId xmlns="" xmlns:a16="http://schemas.microsoft.com/office/drawing/2014/main" id="{F87A09FB-245D-407E-94D1-C81BBB221DC2}"/>
               </a:ext>
             </a:extLst>
           </p:cNvPr>
@@ -2589,7 +2589,7 @@
           <p:cNvPr id="6" name="Fußzeilenplatzhalter 5">
             <a:extLst>
               <a:ext uri="{FF2B5EF4-FFF2-40B4-BE49-F238E27FC236}">
-                <a16:creationId xmlns:a16="http://schemas.microsoft.com/office/drawing/2014/main" xmlns="" id="{7713AD3F-FB16-4761-97DD-7D2895FBAF79}"/>
+                <a16:creationId xmlns="" xmlns:a16="http://schemas.microsoft.com/office/drawing/2014/main" id="{7713AD3F-FB16-4761-97DD-7D2895FBAF79}"/>
               </a:ext>
             </a:extLst>
           </p:cNvPr>
@@ -2622,7 +2622,7 @@
           <p:cNvPr id="7" name="Foliennummernplatzhalter 6">
             <a:extLst>
               <a:ext uri="{FF2B5EF4-FFF2-40B4-BE49-F238E27FC236}">
-                <a16:creationId xmlns:a16="http://schemas.microsoft.com/office/drawing/2014/main" xmlns="" id="{E08B0646-8FC5-4829-A454-55B654DBA3C4}"/>
+                <a16:creationId xmlns="" xmlns:a16="http://schemas.microsoft.com/office/drawing/2014/main" id="{E08B0646-8FC5-4829-A454-55B654DBA3C4}"/>
               </a:ext>
             </a:extLst>
           </p:cNvPr>
@@ -2689,7 +2689,7 @@
           <p:cNvPr id="2" name="Titel 1">
             <a:extLst>
               <a:ext uri="{FF2B5EF4-FFF2-40B4-BE49-F238E27FC236}">
-                <a16:creationId xmlns:a16="http://schemas.microsoft.com/office/drawing/2014/main" xmlns="" id="{87FFCFA6-D29A-4DD6-8A93-5742D6DB0521}"/>
+                <a16:creationId xmlns="" xmlns:a16="http://schemas.microsoft.com/office/drawing/2014/main" id="{87FFCFA6-D29A-4DD6-8A93-5742D6DB0521}"/>
               </a:ext>
             </a:extLst>
           </p:cNvPr>
@@ -2722,7 +2722,7 @@
           <p:cNvPr id="3" name="Textplatzhalter 2">
             <a:extLst>
               <a:ext uri="{FF2B5EF4-FFF2-40B4-BE49-F238E27FC236}">
-                <a16:creationId xmlns:a16="http://schemas.microsoft.com/office/drawing/2014/main" xmlns="" id="{52A062D5-F9A3-40F3-940E-784410DB79B5}"/>
+                <a16:creationId xmlns="" xmlns:a16="http://schemas.microsoft.com/office/drawing/2014/main" id="{52A062D5-F9A3-40F3-940E-784410DB79B5}"/>
               </a:ext>
             </a:extLst>
           </p:cNvPr>
@@ -2793,7 +2793,7 @@
           <p:cNvPr id="4" name="Inhaltsplatzhalter 3">
             <a:extLst>
               <a:ext uri="{FF2B5EF4-FFF2-40B4-BE49-F238E27FC236}">
-                <a16:creationId xmlns:a16="http://schemas.microsoft.com/office/drawing/2014/main" xmlns="" id="{0F2C725F-CDA6-419C-9990-237B92011EB3}"/>
+                <a16:creationId xmlns="" xmlns:a16="http://schemas.microsoft.com/office/drawing/2014/main" id="{0F2C725F-CDA6-419C-9990-237B92011EB3}"/>
               </a:ext>
             </a:extLst>
           </p:cNvPr>
@@ -2855,7 +2855,7 @@
           <p:cNvPr id="5" name="Textplatzhalter 4">
             <a:extLst>
               <a:ext uri="{FF2B5EF4-FFF2-40B4-BE49-F238E27FC236}">
-                <a16:creationId xmlns:a16="http://schemas.microsoft.com/office/drawing/2014/main" xmlns="" id="{57D0AB86-7ACC-4F81-BA1E-EABC81375E4C}"/>
+                <a16:creationId xmlns="" xmlns:a16="http://schemas.microsoft.com/office/drawing/2014/main" id="{57D0AB86-7ACC-4F81-BA1E-EABC81375E4C}"/>
               </a:ext>
             </a:extLst>
           </p:cNvPr>
@@ -2926,7 +2926,7 @@
           <p:cNvPr id="6" name="Inhaltsplatzhalter 5">
             <a:extLst>
               <a:ext uri="{FF2B5EF4-FFF2-40B4-BE49-F238E27FC236}">
-                <a16:creationId xmlns:a16="http://schemas.microsoft.com/office/drawing/2014/main" xmlns="" id="{1A5FCBEC-2F64-4023-881F-8C2D77F12391}"/>
+                <a16:creationId xmlns="" xmlns:a16="http://schemas.microsoft.com/office/drawing/2014/main" id="{1A5FCBEC-2F64-4023-881F-8C2D77F12391}"/>
               </a:ext>
             </a:extLst>
           </p:cNvPr>
@@ -2988,7 +2988,7 @@
           <p:cNvPr id="7" name="Datumsplatzhalter 6">
             <a:extLst>
               <a:ext uri="{FF2B5EF4-FFF2-40B4-BE49-F238E27FC236}">
-                <a16:creationId xmlns:a16="http://schemas.microsoft.com/office/drawing/2014/main" xmlns="" id="{1B579458-8146-4585-8116-8815B1984C10}"/>
+                <a16:creationId xmlns="" xmlns:a16="http://schemas.microsoft.com/office/drawing/2014/main" id="{1B579458-8146-4585-8116-8815B1984C10}"/>
               </a:ext>
             </a:extLst>
           </p:cNvPr>
@@ -3017,7 +3017,7 @@
           <p:cNvPr id="8" name="Fußzeilenplatzhalter 7">
             <a:extLst>
               <a:ext uri="{FF2B5EF4-FFF2-40B4-BE49-F238E27FC236}">
-                <a16:creationId xmlns:a16="http://schemas.microsoft.com/office/drawing/2014/main" xmlns="" id="{B8FE971A-3252-4BEE-AE2A-ED9DD64D786C}"/>
+                <a16:creationId xmlns="" xmlns:a16="http://schemas.microsoft.com/office/drawing/2014/main" id="{B8FE971A-3252-4BEE-AE2A-ED9DD64D786C}"/>
               </a:ext>
             </a:extLst>
           </p:cNvPr>
@@ -3050,7 +3050,7 @@
           <p:cNvPr id="9" name="Foliennummernplatzhalter 8">
             <a:extLst>
               <a:ext uri="{FF2B5EF4-FFF2-40B4-BE49-F238E27FC236}">
-                <a16:creationId xmlns:a16="http://schemas.microsoft.com/office/drawing/2014/main" xmlns="" id="{224F811E-098E-42CD-BF79-561DBDB14DE9}"/>
+                <a16:creationId xmlns="" xmlns:a16="http://schemas.microsoft.com/office/drawing/2014/main" id="{224F811E-098E-42CD-BF79-561DBDB14DE9}"/>
               </a:ext>
             </a:extLst>
           </p:cNvPr>
@@ -3117,7 +3117,7 @@
           <p:cNvPr id="2" name="Titel 1">
             <a:extLst>
               <a:ext uri="{FF2B5EF4-FFF2-40B4-BE49-F238E27FC236}">
-                <a16:creationId xmlns:a16="http://schemas.microsoft.com/office/drawing/2014/main" xmlns="" id="{466DE76C-FB01-463F-B2AD-A897695D3F41}"/>
+                <a16:creationId xmlns="" xmlns:a16="http://schemas.microsoft.com/office/drawing/2014/main" id="{466DE76C-FB01-463F-B2AD-A897695D3F41}"/>
               </a:ext>
             </a:extLst>
           </p:cNvPr>
@@ -3145,7 +3145,7 @@
           <p:cNvPr id="3" name="Datumsplatzhalter 2">
             <a:extLst>
               <a:ext uri="{FF2B5EF4-FFF2-40B4-BE49-F238E27FC236}">
-                <a16:creationId xmlns:a16="http://schemas.microsoft.com/office/drawing/2014/main" xmlns="" id="{6F7936C0-FCFE-4A57-9E63-31F514892227}"/>
+                <a16:creationId xmlns="" xmlns:a16="http://schemas.microsoft.com/office/drawing/2014/main" id="{6F7936C0-FCFE-4A57-9E63-31F514892227}"/>
               </a:ext>
             </a:extLst>
           </p:cNvPr>
@@ -3174,7 +3174,7 @@
           <p:cNvPr id="4" name="Fußzeilenplatzhalter 3">
             <a:extLst>
               <a:ext uri="{FF2B5EF4-FFF2-40B4-BE49-F238E27FC236}">
-                <a16:creationId xmlns:a16="http://schemas.microsoft.com/office/drawing/2014/main" xmlns="" id="{BF4C0BEA-1F74-43B8-B16A-0B93A98AF74A}"/>
+                <a16:creationId xmlns="" xmlns:a16="http://schemas.microsoft.com/office/drawing/2014/main" id="{BF4C0BEA-1F74-43B8-B16A-0B93A98AF74A}"/>
               </a:ext>
             </a:extLst>
           </p:cNvPr>
@@ -3202,7 +3202,7 @@
           <p:cNvPr id="5" name="Foliennummernplatzhalter 4">
             <a:extLst>
               <a:ext uri="{FF2B5EF4-FFF2-40B4-BE49-F238E27FC236}">
-                <a16:creationId xmlns:a16="http://schemas.microsoft.com/office/drawing/2014/main" xmlns="" id="{FDC612F2-A418-4792-A4B4-C0ABBAAB10A0}"/>
+                <a16:creationId xmlns="" xmlns:a16="http://schemas.microsoft.com/office/drawing/2014/main" id="{FDC612F2-A418-4792-A4B4-C0ABBAAB10A0}"/>
               </a:ext>
             </a:extLst>
           </p:cNvPr>
@@ -3269,7 +3269,7 @@
           <p:cNvPr id="2" name="Datumsplatzhalter 1">
             <a:extLst>
               <a:ext uri="{FF2B5EF4-FFF2-40B4-BE49-F238E27FC236}">
-                <a16:creationId xmlns:a16="http://schemas.microsoft.com/office/drawing/2014/main" xmlns="" id="{F1A16BA6-C843-4946-87C4-F009F9659E53}"/>
+                <a16:creationId xmlns="" xmlns:a16="http://schemas.microsoft.com/office/drawing/2014/main" id="{F1A16BA6-C843-4946-87C4-F009F9659E53}"/>
               </a:ext>
             </a:extLst>
           </p:cNvPr>
@@ -3298,7 +3298,7 @@
           <p:cNvPr id="3" name="Fußzeilenplatzhalter 2">
             <a:extLst>
               <a:ext uri="{FF2B5EF4-FFF2-40B4-BE49-F238E27FC236}">
-                <a16:creationId xmlns:a16="http://schemas.microsoft.com/office/drawing/2014/main" xmlns="" id="{74AD0BED-584B-4312-BC56-F22A5A97A8EA}"/>
+                <a16:creationId xmlns="" xmlns:a16="http://schemas.microsoft.com/office/drawing/2014/main" id="{74AD0BED-584B-4312-BC56-F22A5A97A8EA}"/>
               </a:ext>
             </a:extLst>
           </p:cNvPr>
@@ -3331,7 +3331,7 @@
           <p:cNvPr id="4" name="Foliennummernplatzhalter 3">
             <a:extLst>
               <a:ext uri="{FF2B5EF4-FFF2-40B4-BE49-F238E27FC236}">
-                <a16:creationId xmlns:a16="http://schemas.microsoft.com/office/drawing/2014/main" xmlns="" id="{ECAC19A7-F328-409E-92C0-6618959AF8AB}"/>
+                <a16:creationId xmlns="" xmlns:a16="http://schemas.microsoft.com/office/drawing/2014/main" id="{ECAC19A7-F328-409E-92C0-6618959AF8AB}"/>
               </a:ext>
             </a:extLst>
           </p:cNvPr>
@@ -3398,7 +3398,7 @@
           <p:cNvPr id="2" name="Titel 1">
             <a:extLst>
               <a:ext uri="{FF2B5EF4-FFF2-40B4-BE49-F238E27FC236}">
-                <a16:creationId xmlns:a16="http://schemas.microsoft.com/office/drawing/2014/main" xmlns="" id="{36B5D893-6A5A-4F5D-9559-23E40882374B}"/>
+                <a16:creationId xmlns="" xmlns:a16="http://schemas.microsoft.com/office/drawing/2014/main" id="{36B5D893-6A5A-4F5D-9559-23E40882374B}"/>
               </a:ext>
             </a:extLst>
           </p:cNvPr>
@@ -3435,7 +3435,7 @@
           <p:cNvPr id="3" name="Inhaltsplatzhalter 2">
             <a:extLst>
               <a:ext uri="{FF2B5EF4-FFF2-40B4-BE49-F238E27FC236}">
-                <a16:creationId xmlns:a16="http://schemas.microsoft.com/office/drawing/2014/main" xmlns="" id="{46211E4B-EF89-4D03-A97A-6EB546C0498D}"/>
+                <a16:creationId xmlns="" xmlns:a16="http://schemas.microsoft.com/office/drawing/2014/main" id="{46211E4B-EF89-4D03-A97A-6EB546C0498D}"/>
               </a:ext>
             </a:extLst>
           </p:cNvPr>
@@ -3525,7 +3525,7 @@
           <p:cNvPr id="4" name="Textplatzhalter 3">
             <a:extLst>
               <a:ext uri="{FF2B5EF4-FFF2-40B4-BE49-F238E27FC236}">
-                <a16:creationId xmlns:a16="http://schemas.microsoft.com/office/drawing/2014/main" xmlns="" id="{D4BEF54F-E067-4073-A803-29399235D78F}"/>
+                <a16:creationId xmlns="" xmlns:a16="http://schemas.microsoft.com/office/drawing/2014/main" id="{D4BEF54F-E067-4073-A803-29399235D78F}"/>
               </a:ext>
             </a:extLst>
           </p:cNvPr>
@@ -3596,7 +3596,7 @@
           <p:cNvPr id="5" name="Datumsplatzhalter 4">
             <a:extLst>
               <a:ext uri="{FF2B5EF4-FFF2-40B4-BE49-F238E27FC236}">
-                <a16:creationId xmlns:a16="http://schemas.microsoft.com/office/drawing/2014/main" xmlns="" id="{FF25F891-DBFE-4A5B-99B6-66F48C54174B}"/>
+                <a16:creationId xmlns="" xmlns:a16="http://schemas.microsoft.com/office/drawing/2014/main" id="{FF25F891-DBFE-4A5B-99B6-66F48C54174B}"/>
               </a:ext>
             </a:extLst>
           </p:cNvPr>
@@ -3625,7 +3625,7 @@
           <p:cNvPr id="6" name="Fußzeilenplatzhalter 5">
             <a:extLst>
               <a:ext uri="{FF2B5EF4-FFF2-40B4-BE49-F238E27FC236}">
-                <a16:creationId xmlns:a16="http://schemas.microsoft.com/office/drawing/2014/main" xmlns="" id="{C508CE39-F26E-4C31-84CD-D89EC83686D4}"/>
+                <a16:creationId xmlns="" xmlns:a16="http://schemas.microsoft.com/office/drawing/2014/main" id="{C508CE39-F26E-4C31-84CD-D89EC83686D4}"/>
               </a:ext>
             </a:extLst>
           </p:cNvPr>
@@ -3658,7 +3658,7 @@
           <p:cNvPr id="7" name="Foliennummernplatzhalter 6">
             <a:extLst>
               <a:ext uri="{FF2B5EF4-FFF2-40B4-BE49-F238E27FC236}">
-                <a16:creationId xmlns:a16="http://schemas.microsoft.com/office/drawing/2014/main" xmlns="" id="{5E1B48FE-614D-4BF1-8C39-73558F055C10}"/>
+                <a16:creationId xmlns="" xmlns:a16="http://schemas.microsoft.com/office/drawing/2014/main" id="{5E1B48FE-614D-4BF1-8C39-73558F055C10}"/>
               </a:ext>
             </a:extLst>
           </p:cNvPr>
@@ -3725,7 +3725,7 @@
           <p:cNvPr id="2" name="Titel 1">
             <a:extLst>
               <a:ext uri="{FF2B5EF4-FFF2-40B4-BE49-F238E27FC236}">
-                <a16:creationId xmlns:a16="http://schemas.microsoft.com/office/drawing/2014/main" xmlns="" id="{F9563009-E30B-45AC-BDD7-44EA72F78222}"/>
+                <a16:creationId xmlns="" xmlns:a16="http://schemas.microsoft.com/office/drawing/2014/main" id="{F9563009-E30B-45AC-BDD7-44EA72F78222}"/>
               </a:ext>
             </a:extLst>
           </p:cNvPr>
@@ -3762,7 +3762,7 @@
           <p:cNvPr id="3" name="Bildplatzhalter 2">
             <a:extLst>
               <a:ext uri="{FF2B5EF4-FFF2-40B4-BE49-F238E27FC236}">
-                <a16:creationId xmlns:a16="http://schemas.microsoft.com/office/drawing/2014/main" xmlns="" id="{11F2FF9F-8E72-4929-BF76-ED1330B5F674}"/>
+                <a16:creationId xmlns="" xmlns:a16="http://schemas.microsoft.com/office/drawing/2014/main" id="{11F2FF9F-8E72-4929-BF76-ED1330B5F674}"/>
               </a:ext>
             </a:extLst>
           </p:cNvPr>
@@ -3829,7 +3829,7 @@
           <p:cNvPr id="4" name="Textplatzhalter 3">
             <a:extLst>
               <a:ext uri="{FF2B5EF4-FFF2-40B4-BE49-F238E27FC236}">
-                <a16:creationId xmlns:a16="http://schemas.microsoft.com/office/drawing/2014/main" xmlns="" id="{4A21AA90-B6A3-4F03-A71E-8D4EFEBB4E8A}"/>
+                <a16:creationId xmlns="" xmlns:a16="http://schemas.microsoft.com/office/drawing/2014/main" id="{4A21AA90-B6A3-4F03-A71E-8D4EFEBB4E8A}"/>
               </a:ext>
             </a:extLst>
           </p:cNvPr>
@@ -3900,7 +3900,7 @@
           <p:cNvPr id="5" name="Datumsplatzhalter 4">
             <a:extLst>
               <a:ext uri="{FF2B5EF4-FFF2-40B4-BE49-F238E27FC236}">
-                <a16:creationId xmlns:a16="http://schemas.microsoft.com/office/drawing/2014/main" xmlns="" id="{B9A970BA-F10E-430D-9B5F-218F0B6AAD68}"/>
+                <a16:creationId xmlns="" xmlns:a16="http://schemas.microsoft.com/office/drawing/2014/main" id="{B9A970BA-F10E-430D-9B5F-218F0B6AAD68}"/>
               </a:ext>
             </a:extLst>
           </p:cNvPr>
@@ -3929,7 +3929,7 @@
           <p:cNvPr id="6" name="Fußzeilenplatzhalter 5">
             <a:extLst>
               <a:ext uri="{FF2B5EF4-FFF2-40B4-BE49-F238E27FC236}">
-                <a16:creationId xmlns:a16="http://schemas.microsoft.com/office/drawing/2014/main" xmlns="" id="{A141BF1C-61CE-44FF-8ABE-F08D6373AD97}"/>
+                <a16:creationId xmlns="" xmlns:a16="http://schemas.microsoft.com/office/drawing/2014/main" id="{A141BF1C-61CE-44FF-8ABE-F08D6373AD97}"/>
               </a:ext>
             </a:extLst>
           </p:cNvPr>
@@ -3962,7 +3962,7 @@
           <p:cNvPr id="7" name="Foliennummernplatzhalter 6">
             <a:extLst>
               <a:ext uri="{FF2B5EF4-FFF2-40B4-BE49-F238E27FC236}">
-                <a16:creationId xmlns:a16="http://schemas.microsoft.com/office/drawing/2014/main" xmlns="" id="{E76983E8-6FBA-42E6-85DE-B77806E23CA0}"/>
+                <a16:creationId xmlns="" xmlns:a16="http://schemas.microsoft.com/office/drawing/2014/main" id="{E76983E8-6FBA-42E6-85DE-B77806E23CA0}"/>
               </a:ext>
             </a:extLst>
           </p:cNvPr>
@@ -4034,7 +4034,7 @@
           <p:cNvPr id="2" name="Titelplatzhalter 1">
             <a:extLst>
               <a:ext uri="{FF2B5EF4-FFF2-40B4-BE49-F238E27FC236}">
-                <a16:creationId xmlns:a16="http://schemas.microsoft.com/office/drawing/2014/main" xmlns="" id="{F1B54F3D-85D6-4E2A-A184-2AD8788616C7}"/>
+                <a16:creationId xmlns="" xmlns:a16="http://schemas.microsoft.com/office/drawing/2014/main" id="{F1B54F3D-85D6-4E2A-A184-2AD8788616C7}"/>
               </a:ext>
             </a:extLst>
           </p:cNvPr>
@@ -4072,7 +4072,7 @@
           <p:cNvPr id="3" name="Textplatzhalter 2">
             <a:extLst>
               <a:ext uri="{FF2B5EF4-FFF2-40B4-BE49-F238E27FC236}">
-                <a16:creationId xmlns:a16="http://schemas.microsoft.com/office/drawing/2014/main" xmlns="" id="{62C62B55-DAE8-4571-9836-D8A9517A6717}"/>
+                <a16:creationId xmlns="" xmlns:a16="http://schemas.microsoft.com/office/drawing/2014/main" id="{62C62B55-DAE8-4571-9836-D8A9517A6717}"/>
               </a:ext>
             </a:extLst>
           </p:cNvPr>
@@ -4139,7 +4139,7 @@
           <p:cNvPr id="4" name="Datumsplatzhalter 3">
             <a:extLst>
               <a:ext uri="{FF2B5EF4-FFF2-40B4-BE49-F238E27FC236}">
-                <a16:creationId xmlns:a16="http://schemas.microsoft.com/office/drawing/2014/main" xmlns="" id="{202396F9-D19B-4197-A727-060829339B6B}"/>
+                <a16:creationId xmlns="" xmlns:a16="http://schemas.microsoft.com/office/drawing/2014/main" id="{202396F9-D19B-4197-A727-060829339B6B}"/>
               </a:ext>
             </a:extLst>
           </p:cNvPr>
@@ -4186,7 +4186,7 @@
           <p:cNvPr id="5" name="Fußzeilenplatzhalter 4">
             <a:extLst>
               <a:ext uri="{FF2B5EF4-FFF2-40B4-BE49-F238E27FC236}">
-                <a16:creationId xmlns:a16="http://schemas.microsoft.com/office/drawing/2014/main" xmlns="" id="{B1EA6A1B-5C13-45F1-9B85-4169FD91138A}"/>
+                <a16:creationId xmlns="" xmlns:a16="http://schemas.microsoft.com/office/drawing/2014/main" id="{B1EA6A1B-5C13-45F1-9B85-4169FD91138A}"/>
               </a:ext>
             </a:extLst>
           </p:cNvPr>
@@ -4237,7 +4237,7 @@
           <p:cNvPr id="7" name="Grafik 6">
             <a:extLst>
               <a:ext uri="{FF2B5EF4-FFF2-40B4-BE49-F238E27FC236}">
-                <a16:creationId xmlns:a16="http://schemas.microsoft.com/office/drawing/2014/main" xmlns="" id="{C59B35B2-0CE6-4FF9-984D-F5719598069C}"/>
+                <a16:creationId xmlns="" xmlns:a16="http://schemas.microsoft.com/office/drawing/2014/main" id="{C59B35B2-0CE6-4FF9-984D-F5719598069C}"/>
               </a:ext>
             </a:extLst>
           </p:cNvPr>
@@ -4273,7 +4273,7 @@
           <p:cNvPr id="8" name="Foliennummernplatzhalter 7">
             <a:extLst>
               <a:ext uri="{FF2B5EF4-FFF2-40B4-BE49-F238E27FC236}">
-                <a16:creationId xmlns:a16="http://schemas.microsoft.com/office/drawing/2014/main" xmlns="" id="{8B9E18AC-CAF1-4471-BF04-547435D80DDB}"/>
+                <a16:creationId xmlns="" xmlns:a16="http://schemas.microsoft.com/office/drawing/2014/main" id="{8B9E18AC-CAF1-4471-BF04-547435D80DDB}"/>
               </a:ext>
             </a:extLst>
           </p:cNvPr>
@@ -4642,7 +4642,7 @@
           <p:cNvPr id="2" name="Titel 1">
             <a:extLst>
               <a:ext uri="{FF2B5EF4-FFF2-40B4-BE49-F238E27FC236}">
-                <a16:creationId xmlns:a16="http://schemas.microsoft.com/office/drawing/2014/main" xmlns="" id="{19B6AC69-F81D-4459-ACD2-8110FA9FCE24}"/>
+                <a16:creationId xmlns="" xmlns:a16="http://schemas.microsoft.com/office/drawing/2014/main" id="{19B6AC69-F81D-4459-ACD2-8110FA9FCE24}"/>
               </a:ext>
             </a:extLst>
           </p:cNvPr>
@@ -4670,7 +4670,7 @@
           <p:cNvPr id="3" name="Untertitel 2">
             <a:extLst>
               <a:ext uri="{FF2B5EF4-FFF2-40B4-BE49-F238E27FC236}">
-                <a16:creationId xmlns:a16="http://schemas.microsoft.com/office/drawing/2014/main" xmlns="" id="{13737FBA-E6BC-4517-8A74-4336C01F7072}"/>
+                <a16:creationId xmlns="" xmlns:a16="http://schemas.microsoft.com/office/drawing/2014/main" id="{13737FBA-E6BC-4517-8A74-4336C01F7072}"/>
               </a:ext>
             </a:extLst>
           </p:cNvPr>
@@ -4936,6 +4936,13 @@
   <p:clrMapOvr>
     <a:masterClrMapping/>
   </p:clrMapOvr>
+  <p:timing>
+    <p:tnLst>
+      <p:par>
+        <p:cTn id="1" dur="indefinite" restart="never" nodeType="tmRoot"/>
+      </p:par>
+    </p:tnLst>
+  </p:timing>
 </p:sld>
 </file>
 
@@ -5121,6 +5128,13 @@
   <p:clrMapOvr>
     <a:masterClrMapping/>
   </p:clrMapOvr>
+  <p:timing>
+    <p:tnLst>
+      <p:par>
+        <p:cTn id="1" dur="indefinite" restart="never" nodeType="tmRoot"/>
+      </p:par>
+    </p:tnLst>
+  </p:timing>
 </p:sld>
 </file>
 
@@ -5422,14 +5436,7 @@
                 <a:ea typeface="+mn-lt"/>
                 <a:cs typeface="+mn-lt"/>
               </a:rPr>
-              <a:t>90</a:t>
-            </a:r>
-            <a:r>
-              <a:rPr lang="de-DE" dirty="0" smtClean="0">
-                <a:ea typeface="+mn-lt"/>
-                <a:cs typeface="+mn-lt"/>
-              </a:rPr>
-              <a:t>%).</a:t>
+              <a:t>90%).</a:t>
             </a:r>
           </a:p>
           <a:p>
@@ -5567,6 +5574,13 @@
   <p:clrMapOvr>
     <a:masterClrMapping/>
   </p:clrMapOvr>
+  <p:timing>
+    <p:tnLst>
+      <p:par>
+        <p:cTn id="1" dur="indefinite" restart="never" nodeType="tmRoot"/>
+      </p:par>
+    </p:tnLst>
+  </p:timing>
 </p:sld>
 </file>
 
@@ -5966,7 +5980,7 @@
           <p:cNvPr id="7" name="Group 6">
             <a:extLst>
               <a:ext uri="{FF2B5EF4-FFF2-40B4-BE49-F238E27FC236}">
-                <a16:creationId xmlns:a16="http://schemas.microsoft.com/office/drawing/2014/main" xmlns="" id="{7309C384-6DCD-4775-B2C4-21469D66386A}"/>
+                <a16:creationId xmlns="" xmlns:a16="http://schemas.microsoft.com/office/drawing/2014/main" id="{7309C384-6DCD-4775-B2C4-21469D66386A}"/>
               </a:ext>
             </a:extLst>
           </p:cNvPr>
@@ -6385,7 +6399,7 @@
           <p:cNvPr id="3" name="Group 2">
             <a:extLst>
               <a:ext uri="{FF2B5EF4-FFF2-40B4-BE49-F238E27FC236}">
-                <a16:creationId xmlns:a16="http://schemas.microsoft.com/office/drawing/2014/main" xmlns="" id="{38150398-1A64-4FB7-A3DE-19041D5C1156}"/>
+                <a16:creationId xmlns="" xmlns:a16="http://schemas.microsoft.com/office/drawing/2014/main" id="{38150398-1A64-4FB7-A3DE-19041D5C1156}"/>
               </a:ext>
             </a:extLst>
           </p:cNvPr>
@@ -6581,7 +6595,7 @@
           <p:cNvPr id="22" name="Rectangle 21">
             <a:extLst>
               <a:ext uri="{FF2B5EF4-FFF2-40B4-BE49-F238E27FC236}">
-                <a16:creationId xmlns:a16="http://schemas.microsoft.com/office/drawing/2014/main" xmlns="" id="{38C51A38-4A07-49FD-B6ED-48F08A46D64E}"/>
+                <a16:creationId xmlns="" xmlns:a16="http://schemas.microsoft.com/office/drawing/2014/main" id="{38C51A38-4A07-49FD-B6ED-48F08A46D64E}"/>
               </a:ext>
             </a:extLst>
           </p:cNvPr>
@@ -6673,7 +6687,7 @@
           <p:cNvPr id="23" name="Double flèche verticale 40">
             <a:extLst>
               <a:ext uri="{FF2B5EF4-FFF2-40B4-BE49-F238E27FC236}">
-                <a16:creationId xmlns:a16="http://schemas.microsoft.com/office/drawing/2014/main" xmlns="" id="{10F5781E-ED8C-4D2E-B33A-E89C91B92733}"/>
+                <a16:creationId xmlns="" xmlns:a16="http://schemas.microsoft.com/office/drawing/2014/main" id="{10F5781E-ED8C-4D2E-B33A-E89C91B92733}"/>
               </a:ext>
             </a:extLst>
           </p:cNvPr>
@@ -7182,6 +7196,13 @@
   <p:clrMapOvr>
     <a:masterClrMapping/>
   </p:clrMapOvr>
+  <p:timing>
+    <p:tnLst>
+      <p:par>
+        <p:cTn id="1" dur="indefinite" restart="never" nodeType="tmRoot"/>
+      </p:par>
+    </p:tnLst>
+  </p:timing>
 </p:sld>
 </file>
 
@@ -7329,6 +7350,13 @@
   <p:clrMapOvr>
     <a:masterClrMapping/>
   </p:clrMapOvr>
+  <p:timing>
+    <p:tnLst>
+      <p:par>
+        <p:cTn id="1" dur="indefinite" restart="never" nodeType="tmRoot"/>
+      </p:par>
+    </p:tnLst>
+  </p:timing>
 </p:sld>
 </file>
 
@@ -7389,13 +7417,31 @@
           <a:p>
             <a:r>
               <a:rPr lang="en-US" dirty="0" smtClean="0"/>
-              <a:t>Implementation of the backend (Model, Static Matches).</a:t>
-            </a:r>
-          </a:p>
-          <a:p>
+              <a:t>Implementation of the backend (Model, Static Matches)</a:t>
+            </a:r>
+          </a:p>
+          <a:p>
+            <a:pPr lvl="1"/>
             <a:r>
               <a:rPr lang="en-US" dirty="0" smtClean="0"/>
-              <a:t>Regression: Predict the goals scored by each team.</a:t>
+              <a:t>Integrate the model in the backend.</a:t>
+            </a:r>
+          </a:p>
+          <a:p>
+            <a:pPr lvl="1"/>
+            <a:endParaRPr lang="en-US" dirty="0" smtClean="0"/>
+          </a:p>
+          <a:p>
+            <a:r>
+              <a:rPr lang="en-US" dirty="0" smtClean="0"/>
+              <a:t>Regression: Predict the goals scored by each team</a:t>
+            </a:r>
+          </a:p>
+          <a:p>
+            <a:pPr lvl="1"/>
+            <a:r>
+              <a:rPr lang="en-US" dirty="0" smtClean="0"/>
+              <a:t>Research and implement models.</a:t>
             </a:r>
             <a:endParaRPr lang="en-US" dirty="0"/>
           </a:p>
@@ -7439,10 +7485,6 @@
           <a:bodyPr/>
           <a:lstStyle/>
           <a:p>
-            <a:r>
-              <a:rPr lang="de-DE" smtClean="0"/>
-              <a:t>Lisa Boos, Khaled Jallouli</a:t>
-            </a:r>
             <a:endParaRPr lang="de-DE" dirty="0"/>
           </a:p>
         </p:txBody>
@@ -7480,6 +7522,13 @@
   <p:clrMapOvr>
     <a:masterClrMapping/>
   </p:clrMapOvr>
+  <p:timing>
+    <p:tnLst>
+      <p:par>
+        <p:cTn id="1" dur="indefinite" restart="never" nodeType="tmRoot"/>
+      </p:par>
+    </p:tnLst>
+  </p:timing>
 </p:sld>
 </file>
 

</xml_diff>